<commit_message>
updated with a few new steps to help with initial seed and linking of repos
</commit_message>
<xml_diff>
--- a/Data Bricks HOL - Presentation.pptx
+++ b/Data Bricks HOL - Presentation.pptx
@@ -204,7 +204,7 @@
           <a:p>
             <a:fld id="{6C7C4F87-9E86-48F7-BF5E-13B553CFE18D}" type="datetimeFigureOut">
               <a:rPr lang="en-US" smtClean="0"/>
-              <a:t>3/31/2019</a:t>
+              <a:t>4/4/2019</a:t>
             </a:fld>
             <a:endParaRPr lang="en-US"/>
           </a:p>
@@ -1080,7 +1080,7 @@
           <a:p>
             <a:fld id="{DB840BF5-934C-4D96-A55F-8E2C50E11C08}" type="datetimeFigureOut">
               <a:rPr lang="en-US" smtClean="0"/>
-              <a:t>3/31/2019</a:t>
+              <a:t>4/4/2019</a:t>
             </a:fld>
             <a:endParaRPr lang="en-US"/>
           </a:p>
@@ -1278,7 +1278,7 @@
           <a:p>
             <a:fld id="{DB840BF5-934C-4D96-A55F-8E2C50E11C08}" type="datetimeFigureOut">
               <a:rPr lang="en-US" smtClean="0"/>
-              <a:t>3/31/2019</a:t>
+              <a:t>4/4/2019</a:t>
             </a:fld>
             <a:endParaRPr lang="en-US"/>
           </a:p>
@@ -1486,7 +1486,7 @@
           <a:p>
             <a:fld id="{DB840BF5-934C-4D96-A55F-8E2C50E11C08}" type="datetimeFigureOut">
               <a:rPr lang="en-US" smtClean="0"/>
-              <a:t>3/31/2019</a:t>
+              <a:t>4/4/2019</a:t>
             </a:fld>
             <a:endParaRPr lang="en-US"/>
           </a:p>
@@ -1684,7 +1684,7 @@
           <a:p>
             <a:fld id="{DB840BF5-934C-4D96-A55F-8E2C50E11C08}" type="datetimeFigureOut">
               <a:rPr lang="en-US" smtClean="0"/>
-              <a:t>3/31/2019</a:t>
+              <a:t>4/4/2019</a:t>
             </a:fld>
             <a:endParaRPr lang="en-US"/>
           </a:p>
@@ -1959,7 +1959,7 @@
           <a:p>
             <a:fld id="{DB840BF5-934C-4D96-A55F-8E2C50E11C08}" type="datetimeFigureOut">
               <a:rPr lang="en-US" smtClean="0"/>
-              <a:t>3/31/2019</a:t>
+              <a:t>4/4/2019</a:t>
             </a:fld>
             <a:endParaRPr lang="en-US"/>
           </a:p>
@@ -2224,7 +2224,7 @@
           <a:p>
             <a:fld id="{DB840BF5-934C-4D96-A55F-8E2C50E11C08}" type="datetimeFigureOut">
               <a:rPr lang="en-US" smtClean="0"/>
-              <a:t>3/31/2019</a:t>
+              <a:t>4/4/2019</a:t>
             </a:fld>
             <a:endParaRPr lang="en-US"/>
           </a:p>
@@ -2636,7 +2636,7 @@
           <a:p>
             <a:fld id="{DB840BF5-934C-4D96-A55F-8E2C50E11C08}" type="datetimeFigureOut">
               <a:rPr lang="en-US" smtClean="0"/>
-              <a:t>3/31/2019</a:t>
+              <a:t>4/4/2019</a:t>
             </a:fld>
             <a:endParaRPr lang="en-US"/>
           </a:p>
@@ -2777,7 +2777,7 @@
           <a:p>
             <a:fld id="{DB840BF5-934C-4D96-A55F-8E2C50E11C08}" type="datetimeFigureOut">
               <a:rPr lang="en-US" smtClean="0"/>
-              <a:t>3/31/2019</a:t>
+              <a:t>4/4/2019</a:t>
             </a:fld>
             <a:endParaRPr lang="en-US"/>
           </a:p>
@@ -2890,7 +2890,7 @@
           <a:p>
             <a:fld id="{DB840BF5-934C-4D96-A55F-8E2C50E11C08}" type="datetimeFigureOut">
               <a:rPr lang="en-US" smtClean="0"/>
-              <a:t>3/31/2019</a:t>
+              <a:t>4/4/2019</a:t>
             </a:fld>
             <a:endParaRPr lang="en-US"/>
           </a:p>
@@ -3201,7 +3201,7 @@
           <a:p>
             <a:fld id="{DB840BF5-934C-4D96-A55F-8E2C50E11C08}" type="datetimeFigureOut">
               <a:rPr lang="en-US" smtClean="0"/>
-              <a:t>3/31/2019</a:t>
+              <a:t>4/4/2019</a:t>
             </a:fld>
             <a:endParaRPr lang="en-US"/>
           </a:p>
@@ -3489,7 +3489,7 @@
           <a:p>
             <a:fld id="{DB840BF5-934C-4D96-A55F-8E2C50E11C08}" type="datetimeFigureOut">
               <a:rPr lang="en-US" smtClean="0"/>
-              <a:t>3/31/2019</a:t>
+              <a:t>4/4/2019</a:t>
             </a:fld>
             <a:endParaRPr lang="en-US"/>
           </a:p>
@@ -3730,7 +3730,7 @@
           <a:p>
             <a:fld id="{DB840BF5-934C-4D96-A55F-8E2C50E11C08}" type="datetimeFigureOut">
               <a:rPr lang="en-US" smtClean="0"/>
-              <a:t>3/31/2019</a:t>
+              <a:t>4/4/2019</a:t>
             </a:fld>
             <a:endParaRPr lang="en-US"/>
           </a:p>
@@ -4876,7 +4876,7 @@
           <a:lstStyle/>
           <a:p>
             <a:r>
-              <a:rPr lang="en-US"/>
+              <a:rPr lang="en-US" dirty="0"/>
               <a:t>Science Team</a:t>
             </a:r>
           </a:p>
@@ -8261,8 +8261,8 @@
         </p:nvSpPr>
         <p:spPr>
           <a:xfrm>
-            <a:off x="7308550" y="1184901"/>
-            <a:ext cx="2882518" cy="1660437"/>
+            <a:off x="7351586" y="1184901"/>
+            <a:ext cx="2839481" cy="1660437"/>
           </a:xfrm>
           <a:prstGeom prst="roundRect">
             <a:avLst/>
@@ -9054,8 +9054,8 @@
         </p:nvSpPr>
         <p:spPr>
           <a:xfrm>
-            <a:off x="7403920" y="3778121"/>
-            <a:ext cx="2787148" cy="1660437"/>
+            <a:off x="7405758" y="3778121"/>
+            <a:ext cx="2785310" cy="1660437"/>
           </a:xfrm>
           <a:prstGeom prst="roundRect">
             <a:avLst/>
@@ -11033,13 +11033,13 @@
           <a:lstStyle/>
           <a:p>
             <a:r>
-              <a:rPr lang="en-US"/>
+              <a:rPr lang="en-US" dirty="0"/>
               <a:t>Autonomous</a:t>
             </a:r>
           </a:p>
           <a:p>
             <a:r>
-              <a:rPr lang="en-US"/>
+              <a:rPr lang="en-US" dirty="0"/>
               <a:t>Quality Checks</a:t>
             </a:r>
           </a:p>
@@ -11109,7 +11109,7 @@
           <a:lstStyle/>
           <a:p>
             <a:r>
-              <a:rPr lang="en-US"/>
+              <a:rPr lang="en-US" dirty="0"/>
               <a:t>Science Team A</a:t>
             </a:r>
           </a:p>
@@ -12680,7 +12680,7 @@
           <a:lstStyle/>
           <a:p>
             <a:r>
-              <a:rPr lang="en-US"/>
+              <a:rPr lang="en-US" dirty="0"/>
               <a:t>Science Team B</a:t>
             </a:r>
           </a:p>
@@ -12789,7 +12789,7 @@
           <a:lstStyle/>
           <a:p>
             <a:r>
-              <a:rPr lang="en-US"/>
+              <a:rPr lang="en-US" dirty="0"/>
               <a:t>Multi-Tenant &amp; Team</a:t>
             </a:r>
           </a:p>
@@ -16361,6 +16361,21 @@
 </file>
 
 <file path=customXml/item1.xml><?xml version="1.0" encoding="utf-8"?>
+<?mso-contentType ?>
+<FormTemplates xmlns="http://schemas.microsoft.com/sharepoint/v3/contenttype/forms">
+  <Display>DocumentLibraryForm</Display>
+  <Edit>DocumentLibraryForm</Edit>
+  <New>DocumentLibraryForm</New>
+</FormTemplates>
+</file>
+
+<file path=customXml/item2.xml><?xml version="1.0" encoding="utf-8"?>
+<p:properties xmlns:p="http://schemas.microsoft.com/office/2006/metadata/properties" xmlns:xsi="http://www.w3.org/2001/XMLSchema-instance" xmlns:pc="http://schemas.microsoft.com/office/infopath/2007/PartnerControls">
+  <documentManagement/>
+</p:properties>
+</file>
+
+<file path=customXml/item3.xml><?xml version="1.0" encoding="utf-8"?>
 <ct:contentTypeSchema xmlns:ct="http://schemas.microsoft.com/office/2006/metadata/contentType" xmlns:ma="http://schemas.microsoft.com/office/2006/metadata/properties/metaAttributes" ct:_="" ma:_="" ma:contentTypeName="Document" ma:contentTypeID="0x010100CDD97C291E473F49885313FFECADF6F2" ma:contentTypeVersion="14" ma:contentTypeDescription="Create a new document." ma:contentTypeScope="" ma:versionID="14ded871d23898bffa13a9f5d0a0eaba">
   <xsd:schema xmlns:xsd="http://www.w3.org/2001/XMLSchema" xmlns:xs="http://www.w3.org/2001/XMLSchema" xmlns:p="http://schemas.microsoft.com/office/2006/metadata/properties" xmlns:ns2="f9644a9a-f38b-4a9a-8856-dc4340e46959" xmlns:ns3="54000ce9-5312-48ad-8506-e8207e8ba6e6" targetNamespace="http://schemas.microsoft.com/office/2006/metadata/properties" ma:root="true" ma:fieldsID="13c9f4f23145e65a019d6a4e8763d483" ns2:_="" ns3:_="">
     <xsd:import namespace="f9644a9a-f38b-4a9a-8856-dc4340e46959"/>
@@ -16589,36 +16604,10 @@
 </ct:contentTypeSchema>
 </file>
 
-<file path=customXml/item2.xml><?xml version="1.0" encoding="utf-8"?>
-<p:properties xmlns:p="http://schemas.microsoft.com/office/2006/metadata/properties" xmlns:xsi="http://www.w3.org/2001/XMLSchema-instance" xmlns:pc="http://schemas.microsoft.com/office/infopath/2007/PartnerControls">
-  <documentManagement/>
-</p:properties>
-</file>
-
-<file path=customXml/item3.xml><?xml version="1.0" encoding="utf-8"?>
-<?mso-contentType ?>
-<FormTemplates xmlns="http://schemas.microsoft.com/sharepoint/v3/contenttype/forms">
-  <Display>DocumentLibraryForm</Display>
-  <Edit>DocumentLibraryForm</Edit>
-  <New>DocumentLibraryForm</New>
-</FormTemplates>
-</file>
-
 <file path=customXml/itemProps1.xml><?xml version="1.0" encoding="utf-8"?>
-<ds:datastoreItem xmlns:ds="http://schemas.openxmlformats.org/officeDocument/2006/customXml" ds:itemID="{829934BA-D558-4A6E-8C74-EEE2A8D4BB9F}">
+<ds:datastoreItem xmlns:ds="http://schemas.openxmlformats.org/officeDocument/2006/customXml" ds:itemID="{21A17F1B-691D-4331-B50E-24ACF7939001}">
   <ds:schemaRefs>
-    <ds:schemaRef ds:uri="http://schemas.microsoft.com/office/2006/metadata/contentType"/>
-    <ds:schemaRef ds:uri="http://schemas.microsoft.com/office/2006/metadata/properties/metaAttributes"/>
-    <ds:schemaRef ds:uri="http://www.w3.org/2001/XMLSchema"/>
-    <ds:schemaRef ds:uri="http://schemas.microsoft.com/office/2006/metadata/properties"/>
-    <ds:schemaRef ds:uri="f9644a9a-f38b-4a9a-8856-dc4340e46959"/>
-    <ds:schemaRef ds:uri="54000ce9-5312-48ad-8506-e8207e8ba6e6"/>
-    <ds:schemaRef ds:uri="http://schemas.microsoft.com/office/2006/documentManagement/types"/>
-    <ds:schemaRef ds:uri="http://schemas.microsoft.com/office/infopath/2007/PartnerControls"/>
-    <ds:schemaRef ds:uri="http://schemas.openxmlformats.org/package/2006/metadata/core-properties"/>
-    <ds:schemaRef ds:uri="http://purl.org/dc/elements/1.1/"/>
-    <ds:schemaRef ds:uri="http://purl.org/dc/terms/"/>
-    <ds:schemaRef ds:uri="http://schemas.microsoft.com/internal/obd"/>
+    <ds:schemaRef ds:uri="http://schemas.microsoft.com/sharepoint/v3/contenttype/forms"/>
   </ds:schemaRefs>
 </ds:datastoreItem>
 </file>
@@ -16641,9 +16630,20 @@
 </file>
 
 <file path=customXml/itemProps3.xml><?xml version="1.0" encoding="utf-8"?>
-<ds:datastoreItem xmlns:ds="http://schemas.openxmlformats.org/officeDocument/2006/customXml" ds:itemID="{21A17F1B-691D-4331-B50E-24ACF7939001}">
+<ds:datastoreItem xmlns:ds="http://schemas.openxmlformats.org/officeDocument/2006/customXml" ds:itemID="{829934BA-D558-4A6E-8C74-EEE2A8D4BB9F}">
   <ds:schemaRefs>
-    <ds:schemaRef ds:uri="http://schemas.microsoft.com/sharepoint/v3/contenttype/forms"/>
+    <ds:schemaRef ds:uri="http://schemas.microsoft.com/office/2006/metadata/contentType"/>
+    <ds:schemaRef ds:uri="http://schemas.microsoft.com/office/2006/metadata/properties/metaAttributes"/>
+    <ds:schemaRef ds:uri="http://www.w3.org/2001/XMLSchema"/>
+    <ds:schemaRef ds:uri="http://schemas.microsoft.com/office/2006/metadata/properties"/>
+    <ds:schemaRef ds:uri="f9644a9a-f38b-4a9a-8856-dc4340e46959"/>
+    <ds:schemaRef ds:uri="54000ce9-5312-48ad-8506-e8207e8ba6e6"/>
+    <ds:schemaRef ds:uri="http://schemas.microsoft.com/office/2006/documentManagement/types"/>
+    <ds:schemaRef ds:uri="http://schemas.microsoft.com/office/infopath/2007/PartnerControls"/>
+    <ds:schemaRef ds:uri="http://schemas.openxmlformats.org/package/2006/metadata/core-properties"/>
+    <ds:schemaRef ds:uri="http://purl.org/dc/elements/1.1/"/>
+    <ds:schemaRef ds:uri="http://purl.org/dc/terms/"/>
+    <ds:schemaRef ds:uri="http://schemas.microsoft.com/internal/obd"/>
   </ds:schemaRefs>
 </ds:datastoreItem>
 </file>
</xml_diff>